<commit_message>
Code cleanup. Template modification. More context to group text and plots.
</commit_message>
<xml_diff>
--- a/template.pptx
+++ b/template.pptx
@@ -1025,35 +1025,6 @@
       </p:grpSpPr>
       <p:sp>
         <p:nvSpPr>
-          <p:cNvPr id="10" name="TextBox 9"/>
-          <p:cNvSpPr txBox="1"/>
-          <p:nvPr userDrawn="1"/>
-        </p:nvSpPr>
-        <p:spPr>
-          <a:xfrm>
-            <a:off x="4012712" y="107596"/>
-            <a:ext cx="1118576" cy="369332"/>
-          </a:xfrm>
-          <a:prstGeom prst="rect">
-            <a:avLst/>
-          </a:prstGeom>
-          <a:noFill/>
-        </p:spPr>
-        <p:txBody>
-          <a:bodyPr wrap="none" rtlCol="0">
-            <a:spAutoFit/>
-          </a:bodyPr>
-          <a:lstStyle/>
-          <a:p>
-            <a:r>
-              <a:rPr lang="en-US" sz="1800" dirty="0"/>
-              <a:t>FINANCES</a:t>
-            </a:r>
-          </a:p>
-        </p:txBody>
-      </p:sp>
-      <p:sp>
-        <p:nvSpPr>
           <p:cNvPr id="18" name="Rectangle 17"/>
           <p:cNvSpPr/>
           <p:nvPr userDrawn="1"/>
@@ -1372,7 +1343,7 @@
         </p:nvCxnSpPr>
         <p:spPr>
           <a:xfrm>
-            <a:off x="0" y="4688544"/>
+            <a:off x="0" y="5029200"/>
             <a:ext cx="9144000" cy="0"/>
           </a:xfrm>
           <a:prstGeom prst="line">
@@ -1410,8 +1381,8 @@
         </p:nvSpPr>
         <p:spPr>
           <a:xfrm>
-            <a:off x="457200" y="1463040"/>
-            <a:ext cx="1371600" cy="274320"/>
+            <a:off x="457200" y="1389078"/>
+            <a:ext cx="1371600" cy="685800"/>
           </a:xfrm>
           <a:prstGeom prst="rect">
             <a:avLst/>
@@ -1460,8 +1431,8 @@
         </p:nvSpPr>
         <p:spPr>
           <a:xfrm>
-            <a:off x="2743200" y="1463040"/>
-            <a:ext cx="1371600" cy="274320"/>
+            <a:off x="2743200" y="1389078"/>
+            <a:ext cx="1371600" cy="685800"/>
           </a:xfrm>
           <a:prstGeom prst="rect">
             <a:avLst/>
@@ -1510,8 +1481,8 @@
         </p:nvSpPr>
         <p:spPr>
           <a:xfrm>
-            <a:off x="5029200" y="1463040"/>
-            <a:ext cx="1371600" cy="274320"/>
+            <a:off x="5029200" y="1389078"/>
+            <a:ext cx="1371600" cy="685800"/>
           </a:xfrm>
           <a:prstGeom prst="rect">
             <a:avLst/>
@@ -1560,8 +1531,8 @@
         </p:nvSpPr>
         <p:spPr>
           <a:xfrm>
-            <a:off x="7315200" y="1463040"/>
-            <a:ext cx="1371600" cy="274320"/>
+            <a:off x="7315200" y="1389078"/>
+            <a:ext cx="1371600" cy="685800"/>
           </a:xfrm>
           <a:prstGeom prst="rect">
             <a:avLst/>

</xml_diff>

<commit_message>
Removed notes section from template. Added rollover feature.
</commit_message>
<xml_diff>
--- a/template.pptx
+++ b/template.pptx
@@ -197,7 +197,7 @@
           <a:p>
             <a:fld id="{EB0B25D1-6DE4-4472-9476-CB2A7CE1AE4C}" type="datetimeFigureOut">
               <a:rPr lang="en-US" smtClean="0"/>
-              <a:t>1/2/2017</a:t>
+              <a:t>1/28/2017</a:t>
             </a:fld>
             <a:endParaRPr lang="en-US"/>
           </a:p>
@@ -595,7 +595,7 @@
           <a:p>
             <a:fld id="{7A43FB9E-5C01-4EE0-81CD-BFBEB769D009}" type="datetimeFigureOut">
               <a:rPr lang="en-US" smtClean="0"/>
-              <a:t>1/2/2017</a:t>
+              <a:t>1/28/2017</a:t>
             </a:fld>
             <a:endParaRPr lang="en-US"/>
           </a:p>
@@ -765,7 +765,7 @@
           <a:p>
             <a:fld id="{7A43FB9E-5C01-4EE0-81CD-BFBEB769D009}" type="datetimeFigureOut">
               <a:rPr lang="en-US" smtClean="0"/>
-              <a:t>1/2/2017</a:t>
+              <a:t>1/28/2017</a:t>
             </a:fld>
             <a:endParaRPr lang="en-US"/>
           </a:p>
@@ -945,7 +945,7 @@
           <a:p>
             <a:fld id="{7A43FB9E-5C01-4EE0-81CD-BFBEB769D009}" type="datetimeFigureOut">
               <a:rPr lang="en-US" smtClean="0"/>
-              <a:t>1/2/2017</a:t>
+              <a:t>1/28/2017</a:t>
             </a:fld>
             <a:endParaRPr lang="en-US"/>
           </a:p>
@@ -1602,6 +1602,564 @@
 </p:sldLayout>
 </file>
 
+<file path=ppt/slideLayouts/slideLayout13.xml><?xml version="1.0" encoding="utf-8"?>
+<p:sldLayout xmlns:a="http://schemas.openxmlformats.org/drawingml/2006/main" xmlns:r="http://schemas.openxmlformats.org/officeDocument/2006/relationships" xmlns:p="http://schemas.openxmlformats.org/presentationml/2006/main" preserve="1" userDrawn="1">
+  <p:cSld name="Dashboard2">
+    <p:spTree>
+      <p:nvGrpSpPr>
+        <p:cNvPr id="1" name=""/>
+        <p:cNvGrpSpPr/>
+        <p:nvPr/>
+      </p:nvGrpSpPr>
+      <p:grpSpPr>
+        <a:xfrm>
+          <a:off x="0" y="0"/>
+          <a:ext cx="0" cy="0"/>
+          <a:chOff x="0" y="0"/>
+          <a:chExt cx="0" cy="0"/>
+        </a:xfrm>
+      </p:grpSpPr>
+      <p:sp>
+        <p:nvSpPr>
+          <p:cNvPr id="18" name="Rectangle 17"/>
+          <p:cNvSpPr/>
+          <p:nvPr userDrawn="1"/>
+        </p:nvSpPr>
+        <p:spPr>
+          <a:xfrm>
+            <a:off x="0" y="770964"/>
+            <a:ext cx="2286000" cy="6087036"/>
+          </a:xfrm>
+          <a:prstGeom prst="rect">
+            <a:avLst/>
+          </a:prstGeom>
+          <a:noFill/>
+          <a:ln>
+            <a:solidFill>
+              <a:schemeClr val="tx1">
+                <a:lumMod val="50000"/>
+                <a:lumOff val="50000"/>
+              </a:schemeClr>
+            </a:solidFill>
+          </a:ln>
+        </p:spPr>
+        <p:style>
+          <a:lnRef idx="2">
+            <a:schemeClr val="accent1">
+              <a:shade val="50000"/>
+            </a:schemeClr>
+          </a:lnRef>
+          <a:fillRef idx="1">
+            <a:schemeClr val="accent1"/>
+          </a:fillRef>
+          <a:effectRef idx="0">
+            <a:schemeClr val="accent1"/>
+          </a:effectRef>
+          <a:fontRef idx="minor">
+            <a:schemeClr val="lt1"/>
+          </a:fontRef>
+        </p:style>
+        <p:txBody>
+          <a:bodyPr rtlCol="0" anchor="ctr"/>
+          <a:lstStyle/>
+          <a:p>
+            <a:pPr algn="ctr"/>
+            <a:endParaRPr lang="en-US"/>
+          </a:p>
+        </p:txBody>
+      </p:sp>
+      <p:sp>
+        <p:nvSpPr>
+          <p:cNvPr id="19" name="Rectangle 18"/>
+          <p:cNvSpPr/>
+          <p:nvPr userDrawn="1"/>
+        </p:nvSpPr>
+        <p:spPr>
+          <a:xfrm>
+            <a:off x="2286000" y="770964"/>
+            <a:ext cx="2286000" cy="6087036"/>
+          </a:xfrm>
+          <a:prstGeom prst="rect">
+            <a:avLst/>
+          </a:prstGeom>
+          <a:noFill/>
+          <a:ln>
+            <a:solidFill>
+              <a:schemeClr val="tx1">
+                <a:lumMod val="50000"/>
+                <a:lumOff val="50000"/>
+              </a:schemeClr>
+            </a:solidFill>
+          </a:ln>
+        </p:spPr>
+        <p:style>
+          <a:lnRef idx="2">
+            <a:schemeClr val="accent1">
+              <a:shade val="50000"/>
+            </a:schemeClr>
+          </a:lnRef>
+          <a:fillRef idx="1">
+            <a:schemeClr val="accent1"/>
+          </a:fillRef>
+          <a:effectRef idx="0">
+            <a:schemeClr val="accent1"/>
+          </a:effectRef>
+          <a:fontRef idx="minor">
+            <a:schemeClr val="lt1"/>
+          </a:fontRef>
+        </p:style>
+        <p:txBody>
+          <a:bodyPr rtlCol="0" anchor="ctr"/>
+          <a:lstStyle/>
+          <a:p>
+            <a:pPr algn="ctr"/>
+            <a:endParaRPr lang="en-US"/>
+          </a:p>
+        </p:txBody>
+      </p:sp>
+      <p:sp>
+        <p:nvSpPr>
+          <p:cNvPr id="20" name="Rectangle 19"/>
+          <p:cNvSpPr/>
+          <p:nvPr userDrawn="1"/>
+        </p:nvSpPr>
+        <p:spPr>
+          <a:xfrm>
+            <a:off x="4572000" y="770964"/>
+            <a:ext cx="2286000" cy="6087036"/>
+          </a:xfrm>
+          <a:prstGeom prst="rect">
+            <a:avLst/>
+          </a:prstGeom>
+          <a:noFill/>
+          <a:ln>
+            <a:solidFill>
+              <a:schemeClr val="tx1">
+                <a:lumMod val="50000"/>
+                <a:lumOff val="50000"/>
+              </a:schemeClr>
+            </a:solidFill>
+          </a:ln>
+        </p:spPr>
+        <p:style>
+          <a:lnRef idx="2">
+            <a:schemeClr val="accent1">
+              <a:shade val="50000"/>
+            </a:schemeClr>
+          </a:lnRef>
+          <a:fillRef idx="1">
+            <a:schemeClr val="accent1"/>
+          </a:fillRef>
+          <a:effectRef idx="0">
+            <a:schemeClr val="accent1"/>
+          </a:effectRef>
+          <a:fontRef idx="minor">
+            <a:schemeClr val="lt1"/>
+          </a:fontRef>
+        </p:style>
+        <p:txBody>
+          <a:bodyPr rtlCol="0" anchor="ctr"/>
+          <a:lstStyle/>
+          <a:p>
+            <a:pPr algn="ctr"/>
+            <a:endParaRPr lang="en-US"/>
+          </a:p>
+        </p:txBody>
+      </p:sp>
+      <p:sp>
+        <p:nvSpPr>
+          <p:cNvPr id="21" name="Rectangle 20"/>
+          <p:cNvSpPr/>
+          <p:nvPr userDrawn="1"/>
+        </p:nvSpPr>
+        <p:spPr>
+          <a:xfrm>
+            <a:off x="6858000" y="770964"/>
+            <a:ext cx="2286000" cy="6087036"/>
+          </a:xfrm>
+          <a:prstGeom prst="rect">
+            <a:avLst/>
+          </a:prstGeom>
+          <a:noFill/>
+          <a:ln>
+            <a:solidFill>
+              <a:schemeClr val="tx1">
+                <a:lumMod val="50000"/>
+                <a:lumOff val="50000"/>
+              </a:schemeClr>
+            </a:solidFill>
+          </a:ln>
+        </p:spPr>
+        <p:style>
+          <a:lnRef idx="2">
+            <a:schemeClr val="accent1">
+              <a:shade val="50000"/>
+            </a:schemeClr>
+          </a:lnRef>
+          <a:fillRef idx="1">
+            <a:schemeClr val="accent1"/>
+          </a:fillRef>
+          <a:effectRef idx="0">
+            <a:schemeClr val="accent1"/>
+          </a:effectRef>
+          <a:fontRef idx="minor">
+            <a:schemeClr val="lt1"/>
+          </a:fontRef>
+        </p:style>
+        <p:txBody>
+          <a:bodyPr rtlCol="0" anchor="ctr"/>
+          <a:lstStyle/>
+          <a:p>
+            <a:pPr algn="ctr"/>
+            <a:endParaRPr lang="en-US"/>
+          </a:p>
+        </p:txBody>
+      </p:sp>
+      <p:sp>
+        <p:nvSpPr>
+          <p:cNvPr id="22" name="TextBox 21"/>
+          <p:cNvSpPr txBox="1"/>
+          <p:nvPr userDrawn="1"/>
+        </p:nvSpPr>
+        <p:spPr>
+          <a:xfrm>
+            <a:off x="846657" y="925179"/>
+            <a:ext cx="601831" cy="338554"/>
+          </a:xfrm>
+          <a:prstGeom prst="rect">
+            <a:avLst/>
+          </a:prstGeom>
+          <a:noFill/>
+        </p:spPr>
+        <p:txBody>
+          <a:bodyPr wrap="none" rtlCol="0">
+            <a:spAutoFit/>
+          </a:bodyPr>
+          <a:lstStyle/>
+          <a:p>
+            <a:r>
+              <a:rPr lang="en-US" sz="1600" dirty="0"/>
+              <a:t>Food</a:t>
+            </a:r>
+          </a:p>
+        </p:txBody>
+      </p:sp>
+      <p:sp>
+        <p:nvSpPr>
+          <p:cNvPr id="23" name="TextBox 22"/>
+          <p:cNvSpPr txBox="1"/>
+          <p:nvPr userDrawn="1"/>
+        </p:nvSpPr>
+        <p:spPr>
+          <a:xfrm>
+            <a:off x="2948741" y="925179"/>
+            <a:ext cx="960519" cy="338554"/>
+          </a:xfrm>
+          <a:prstGeom prst="rect">
+            <a:avLst/>
+          </a:prstGeom>
+          <a:noFill/>
+        </p:spPr>
+        <p:txBody>
+          <a:bodyPr wrap="none" rtlCol="0">
+            <a:spAutoFit/>
+          </a:bodyPr>
+          <a:lstStyle/>
+          <a:p>
+            <a:r>
+              <a:rPr lang="en-US" sz="1600" dirty="0"/>
+              <a:t>Shopping</a:t>
+            </a:r>
+          </a:p>
+        </p:txBody>
+      </p:sp>
+      <p:sp>
+        <p:nvSpPr>
+          <p:cNvPr id="24" name="TextBox 23"/>
+          <p:cNvSpPr txBox="1"/>
+          <p:nvPr userDrawn="1"/>
+        </p:nvSpPr>
+        <p:spPr>
+          <a:xfrm>
+            <a:off x="5243557" y="925179"/>
+            <a:ext cx="942887" cy="338554"/>
+          </a:xfrm>
+          <a:prstGeom prst="rect">
+            <a:avLst/>
+          </a:prstGeom>
+          <a:noFill/>
+        </p:spPr>
+        <p:txBody>
+          <a:bodyPr wrap="none" rtlCol="0">
+            <a:spAutoFit/>
+          </a:bodyPr>
+          <a:lstStyle/>
+          <a:p>
+            <a:r>
+              <a:rPr lang="en-US" sz="1600" dirty="0"/>
+              <a:t>Activities</a:t>
+            </a:r>
+          </a:p>
+        </p:txBody>
+      </p:sp>
+      <p:sp>
+        <p:nvSpPr>
+          <p:cNvPr id="25" name="TextBox 24"/>
+          <p:cNvSpPr txBox="1"/>
+          <p:nvPr userDrawn="1"/>
+        </p:nvSpPr>
+        <p:spPr>
+          <a:xfrm>
+            <a:off x="7665011" y="925179"/>
+            <a:ext cx="671979" cy="338554"/>
+          </a:xfrm>
+          <a:prstGeom prst="rect">
+            <a:avLst/>
+          </a:prstGeom>
+          <a:noFill/>
+        </p:spPr>
+        <p:txBody>
+          <a:bodyPr wrap="none" rtlCol="0">
+            <a:spAutoFit/>
+          </a:bodyPr>
+          <a:lstStyle/>
+          <a:p>
+            <a:r>
+              <a:rPr lang="en-US" sz="1600" dirty="0"/>
+              <a:t>Other</a:t>
+            </a:r>
+          </a:p>
+        </p:txBody>
+      </p:sp>
+      <p:sp>
+        <p:nvSpPr>
+          <p:cNvPr id="12" name="Rectangle 11"/>
+          <p:cNvSpPr/>
+          <p:nvPr userDrawn="1"/>
+        </p:nvSpPr>
+        <p:spPr>
+          <a:xfrm>
+            <a:off x="457200" y="1389078"/>
+            <a:ext cx="1371600" cy="685800"/>
+          </a:xfrm>
+          <a:prstGeom prst="rect">
+            <a:avLst/>
+          </a:prstGeom>
+          <a:noFill/>
+          <a:ln>
+            <a:solidFill>
+              <a:schemeClr val="tx1">
+                <a:lumMod val="50000"/>
+                <a:lumOff val="50000"/>
+              </a:schemeClr>
+            </a:solidFill>
+            <a:prstDash val="sysDash"/>
+          </a:ln>
+        </p:spPr>
+        <p:style>
+          <a:lnRef idx="2">
+            <a:schemeClr val="accent1">
+              <a:shade val="50000"/>
+            </a:schemeClr>
+          </a:lnRef>
+          <a:fillRef idx="1">
+            <a:schemeClr val="accent1"/>
+          </a:fillRef>
+          <a:effectRef idx="0">
+            <a:schemeClr val="accent1"/>
+          </a:effectRef>
+          <a:fontRef idx="minor">
+            <a:schemeClr val="lt1"/>
+          </a:fontRef>
+        </p:style>
+        <p:txBody>
+          <a:bodyPr rtlCol="0" anchor="ctr"/>
+          <a:lstStyle/>
+          <a:p>
+            <a:pPr algn="ctr"/>
+            <a:endParaRPr lang="en-US"/>
+          </a:p>
+        </p:txBody>
+      </p:sp>
+      <p:sp>
+        <p:nvSpPr>
+          <p:cNvPr id="13" name="Rectangle 12"/>
+          <p:cNvSpPr/>
+          <p:nvPr userDrawn="1"/>
+        </p:nvSpPr>
+        <p:spPr>
+          <a:xfrm>
+            <a:off x="2743200" y="1389078"/>
+            <a:ext cx="1371600" cy="685800"/>
+          </a:xfrm>
+          <a:prstGeom prst="rect">
+            <a:avLst/>
+          </a:prstGeom>
+          <a:noFill/>
+          <a:ln>
+            <a:solidFill>
+              <a:schemeClr val="tx1">
+                <a:lumMod val="50000"/>
+                <a:lumOff val="50000"/>
+              </a:schemeClr>
+            </a:solidFill>
+            <a:prstDash val="sysDash"/>
+          </a:ln>
+        </p:spPr>
+        <p:style>
+          <a:lnRef idx="2">
+            <a:schemeClr val="accent1">
+              <a:shade val="50000"/>
+            </a:schemeClr>
+          </a:lnRef>
+          <a:fillRef idx="1">
+            <a:schemeClr val="accent1"/>
+          </a:fillRef>
+          <a:effectRef idx="0">
+            <a:schemeClr val="accent1"/>
+          </a:effectRef>
+          <a:fontRef idx="minor">
+            <a:schemeClr val="lt1"/>
+          </a:fontRef>
+        </p:style>
+        <p:txBody>
+          <a:bodyPr rtlCol="0" anchor="ctr"/>
+          <a:lstStyle/>
+          <a:p>
+            <a:pPr algn="ctr"/>
+            <a:endParaRPr lang="en-US"/>
+          </a:p>
+        </p:txBody>
+      </p:sp>
+      <p:sp>
+        <p:nvSpPr>
+          <p:cNvPr id="14" name="Rectangle 13"/>
+          <p:cNvSpPr/>
+          <p:nvPr userDrawn="1"/>
+        </p:nvSpPr>
+        <p:spPr>
+          <a:xfrm>
+            <a:off x="5029200" y="1389078"/>
+            <a:ext cx="1371600" cy="685800"/>
+          </a:xfrm>
+          <a:prstGeom prst="rect">
+            <a:avLst/>
+          </a:prstGeom>
+          <a:noFill/>
+          <a:ln>
+            <a:solidFill>
+              <a:schemeClr val="tx1">
+                <a:lumMod val="50000"/>
+                <a:lumOff val="50000"/>
+              </a:schemeClr>
+            </a:solidFill>
+            <a:prstDash val="sysDash"/>
+          </a:ln>
+        </p:spPr>
+        <p:style>
+          <a:lnRef idx="2">
+            <a:schemeClr val="accent1">
+              <a:shade val="50000"/>
+            </a:schemeClr>
+          </a:lnRef>
+          <a:fillRef idx="1">
+            <a:schemeClr val="accent1"/>
+          </a:fillRef>
+          <a:effectRef idx="0">
+            <a:schemeClr val="accent1"/>
+          </a:effectRef>
+          <a:fontRef idx="minor">
+            <a:schemeClr val="lt1"/>
+          </a:fontRef>
+        </p:style>
+        <p:txBody>
+          <a:bodyPr rtlCol="0" anchor="ctr"/>
+          <a:lstStyle/>
+          <a:p>
+            <a:pPr algn="ctr"/>
+            <a:endParaRPr lang="en-US"/>
+          </a:p>
+        </p:txBody>
+      </p:sp>
+      <p:sp>
+        <p:nvSpPr>
+          <p:cNvPr id="15" name="Rectangle 14"/>
+          <p:cNvSpPr/>
+          <p:nvPr userDrawn="1"/>
+        </p:nvSpPr>
+        <p:spPr>
+          <a:xfrm>
+            <a:off x="7315200" y="1389078"/>
+            <a:ext cx="1371600" cy="685800"/>
+          </a:xfrm>
+          <a:prstGeom prst="rect">
+            <a:avLst/>
+          </a:prstGeom>
+          <a:noFill/>
+          <a:ln>
+            <a:solidFill>
+              <a:schemeClr val="tx1">
+                <a:lumMod val="50000"/>
+                <a:lumOff val="50000"/>
+              </a:schemeClr>
+            </a:solidFill>
+            <a:prstDash val="sysDash"/>
+          </a:ln>
+        </p:spPr>
+        <p:style>
+          <a:lnRef idx="2">
+            <a:schemeClr val="accent1">
+              <a:shade val="50000"/>
+            </a:schemeClr>
+          </a:lnRef>
+          <a:fillRef idx="1">
+            <a:schemeClr val="accent1"/>
+          </a:fillRef>
+          <a:effectRef idx="0">
+            <a:schemeClr val="accent1"/>
+          </a:effectRef>
+          <a:fontRef idx="minor">
+            <a:schemeClr val="lt1"/>
+          </a:fontRef>
+        </p:style>
+        <p:txBody>
+          <a:bodyPr rtlCol="0" anchor="ctr"/>
+          <a:lstStyle/>
+          <a:p>
+            <a:pPr algn="ctr"/>
+            <a:endParaRPr lang="en-US"/>
+          </a:p>
+        </p:txBody>
+      </p:sp>
+    </p:spTree>
+    <p:extLst>
+      <p:ext uri="{BB962C8B-B14F-4D97-AF65-F5344CB8AC3E}">
+        <p14:creationId xmlns:p14="http://schemas.microsoft.com/office/powerpoint/2010/main" val="3290138150"/>
+      </p:ext>
+    </p:extLst>
+  </p:cSld>
+  <p:clrMapOvr>
+    <a:masterClrMapping/>
+  </p:clrMapOvr>
+  <p:extLst mod="1">
+    <p:ext uri="{DCECCB84-F9BA-43D5-87BE-67443E8EF086}">
+      <p15:sldGuideLst xmlns:p15="http://schemas.microsoft.com/office/powerpoint/2012/main">
+        <p15:guide id="1" orient="horz" pos="2160">
+          <p15:clr>
+            <a:srgbClr val="FBAE40"/>
+          </p15:clr>
+        </p15:guide>
+        <p15:guide id="2" pos="2880">
+          <p15:clr>
+            <a:srgbClr val="FBAE40"/>
+          </p15:clr>
+        </p15:guide>
+      </p15:sldGuideLst>
+    </p:ext>
+  </p:extLst>
+</p:sldLayout>
+</file>
+
 <file path=ppt/slideLayouts/slideLayout2.xml><?xml version="1.0" encoding="utf-8"?>
 <p:sldLayout xmlns:a="http://schemas.openxmlformats.org/drawingml/2006/main" xmlns:r="http://schemas.openxmlformats.org/officeDocument/2006/relationships" xmlns:p="http://schemas.openxmlformats.org/presentationml/2006/main" type="obj" preserve="1">
   <p:cSld name="Title and Content">
@@ -1711,7 +2269,7 @@
           <a:p>
             <a:fld id="{7A43FB9E-5C01-4EE0-81CD-BFBEB769D009}" type="datetimeFigureOut">
               <a:rPr lang="en-US" smtClean="0"/>
-              <a:t>1/2/2017</a:t>
+              <a:t>1/28/2017</a:t>
             </a:fld>
             <a:endParaRPr lang="en-US"/>
           </a:p>
@@ -1955,7 +2513,7 @@
           <a:p>
             <a:fld id="{7A43FB9E-5C01-4EE0-81CD-BFBEB769D009}" type="datetimeFigureOut">
               <a:rPr lang="en-US" smtClean="0"/>
-              <a:t>1/2/2017</a:t>
+              <a:t>1/28/2017</a:t>
             </a:fld>
             <a:endParaRPr lang="en-US"/>
           </a:p>
@@ -2187,7 +2745,7 @@
           <a:p>
             <a:fld id="{7A43FB9E-5C01-4EE0-81CD-BFBEB769D009}" type="datetimeFigureOut">
               <a:rPr lang="en-US" smtClean="0"/>
-              <a:t>1/2/2017</a:t>
+              <a:t>1/28/2017</a:t>
             </a:fld>
             <a:endParaRPr lang="en-US"/>
           </a:p>
@@ -2554,7 +3112,7 @@
           <a:p>
             <a:fld id="{7A43FB9E-5C01-4EE0-81CD-BFBEB769D009}" type="datetimeFigureOut">
               <a:rPr lang="en-US" smtClean="0"/>
-              <a:t>1/2/2017</a:t>
+              <a:t>1/28/2017</a:t>
             </a:fld>
             <a:endParaRPr lang="en-US"/>
           </a:p>
@@ -2672,7 +3230,7 @@
           <a:p>
             <a:fld id="{7A43FB9E-5C01-4EE0-81CD-BFBEB769D009}" type="datetimeFigureOut">
               <a:rPr lang="en-US" smtClean="0"/>
-              <a:t>1/2/2017</a:t>
+              <a:t>1/28/2017</a:t>
             </a:fld>
             <a:endParaRPr lang="en-US"/>
           </a:p>
@@ -2767,7 +3325,7 @@
           <a:p>
             <a:fld id="{7A43FB9E-5C01-4EE0-81CD-BFBEB769D009}" type="datetimeFigureOut">
               <a:rPr lang="en-US" smtClean="0"/>
-              <a:t>1/2/2017</a:t>
+              <a:t>1/28/2017</a:t>
             </a:fld>
             <a:endParaRPr lang="en-US"/>
           </a:p>
@@ -3044,7 +3602,7 @@
           <a:p>
             <a:fld id="{7A43FB9E-5C01-4EE0-81CD-BFBEB769D009}" type="datetimeFigureOut">
               <a:rPr lang="en-US" smtClean="0"/>
-              <a:t>1/2/2017</a:t>
+              <a:t>1/28/2017</a:t>
             </a:fld>
             <a:endParaRPr lang="en-US"/>
           </a:p>
@@ -3301,7 +3859,7 @@
           <a:p>
             <a:fld id="{7A43FB9E-5C01-4EE0-81CD-BFBEB769D009}" type="datetimeFigureOut">
               <a:rPr lang="en-US" smtClean="0"/>
-              <a:t>1/2/2017</a:t>
+              <a:t>1/28/2017</a:t>
             </a:fld>
             <a:endParaRPr lang="en-US"/>
           </a:p>
@@ -3514,7 +4072,7 @@
           <a:p>
             <a:fld id="{7A43FB9E-5C01-4EE0-81CD-BFBEB769D009}" type="datetimeFigureOut">
               <a:rPr lang="en-US" smtClean="0"/>
-              <a:t>1/2/2017</a:t>
+              <a:t>1/28/2017</a:t>
             </a:fld>
             <a:endParaRPr lang="en-US"/>
           </a:p>
@@ -3619,6 +4177,7 @@
     <p:sldLayoutId id="2147483661" r:id="rId10"/>
     <p:sldLayoutId id="2147483662" r:id="rId11"/>
     <p:sldLayoutId id="2147483650" r:id="rId12"/>
+    <p:sldLayoutId id="2147483663" r:id="rId13"/>
   </p:sldLayoutIdLst>
   <p:txStyles>
     <p:titleStyle>

</xml_diff>